<commit_message>
Added aims and objectives slides
</commit_message>
<xml_diff>
--- a/ava-presentation.pptx
+++ b/ava-presentation.pptx
@@ -8,15 +8,18 @@
     <p:sldId id="256" r:id="rId2"/>
     <p:sldId id="268" r:id="rId3"/>
     <p:sldId id="261" r:id="rId4"/>
-    <p:sldId id="263" r:id="rId5"/>
-    <p:sldId id="264" r:id="rId6"/>
-    <p:sldId id="265" r:id="rId7"/>
-    <p:sldId id="267" r:id="rId8"/>
-    <p:sldId id="266" r:id="rId9"/>
-    <p:sldId id="262" r:id="rId10"/>
-    <p:sldId id="257" r:id="rId11"/>
-    <p:sldId id="259" r:id="rId12"/>
-    <p:sldId id="260" r:id="rId13"/>
+    <p:sldId id="269" r:id="rId5"/>
+    <p:sldId id="270" r:id="rId6"/>
+    <p:sldId id="271" r:id="rId7"/>
+    <p:sldId id="272" r:id="rId8"/>
+    <p:sldId id="264" r:id="rId9"/>
+    <p:sldId id="265" r:id="rId10"/>
+    <p:sldId id="267" r:id="rId11"/>
+    <p:sldId id="266" r:id="rId12"/>
+    <p:sldId id="262" r:id="rId13"/>
+    <p:sldId id="257" r:id="rId14"/>
+    <p:sldId id="259" r:id="rId15"/>
+    <p:sldId id="260" r:id="rId16"/>
   </p:sldIdLst>
   <p:sldSz cx="12192000" cy="6858000"/>
   <p:notesSz cx="6858000" cy="9144000"/>
@@ -270,7 +273,7 @@
           <a:p>
             <a:fld id="{033AF4C7-B9F7-8C43-BECF-42CF3A22F2FA}" type="datetimeFigureOut">
               <a:rPr lang="en-US" smtClean="0"/>
-              <a:t>3/8/2018</a:t>
+              <a:t>3/20/2018</a:t>
             </a:fld>
             <a:endParaRPr lang="en-US"/>
           </a:p>
@@ -468,7 +471,7 @@
           <a:p>
             <a:fld id="{033AF4C7-B9F7-8C43-BECF-42CF3A22F2FA}" type="datetimeFigureOut">
               <a:rPr lang="en-US" smtClean="0"/>
-              <a:t>3/8/2018</a:t>
+              <a:t>3/20/2018</a:t>
             </a:fld>
             <a:endParaRPr lang="en-US"/>
           </a:p>
@@ -676,7 +679,7 @@
           <a:p>
             <a:fld id="{033AF4C7-B9F7-8C43-BECF-42CF3A22F2FA}" type="datetimeFigureOut">
               <a:rPr lang="en-US" smtClean="0"/>
-              <a:t>3/8/2018</a:t>
+              <a:t>3/20/2018</a:t>
             </a:fld>
             <a:endParaRPr lang="en-US"/>
           </a:p>
@@ -874,7 +877,7 @@
           <a:p>
             <a:fld id="{033AF4C7-B9F7-8C43-BECF-42CF3A22F2FA}" type="datetimeFigureOut">
               <a:rPr lang="en-US" smtClean="0"/>
-              <a:t>3/8/2018</a:t>
+              <a:t>3/20/2018</a:t>
             </a:fld>
             <a:endParaRPr lang="en-US"/>
           </a:p>
@@ -1149,7 +1152,7 @@
           <a:p>
             <a:fld id="{033AF4C7-B9F7-8C43-BECF-42CF3A22F2FA}" type="datetimeFigureOut">
               <a:rPr lang="en-US" smtClean="0"/>
-              <a:t>3/8/2018</a:t>
+              <a:t>3/20/2018</a:t>
             </a:fld>
             <a:endParaRPr lang="en-US"/>
           </a:p>
@@ -1414,7 +1417,7 @@
           <a:p>
             <a:fld id="{033AF4C7-B9F7-8C43-BECF-42CF3A22F2FA}" type="datetimeFigureOut">
               <a:rPr lang="en-US" smtClean="0"/>
-              <a:t>3/8/2018</a:t>
+              <a:t>3/20/2018</a:t>
             </a:fld>
             <a:endParaRPr lang="en-US"/>
           </a:p>
@@ -1826,7 +1829,7 @@
           <a:p>
             <a:fld id="{033AF4C7-B9F7-8C43-BECF-42CF3A22F2FA}" type="datetimeFigureOut">
               <a:rPr lang="en-US" smtClean="0"/>
-              <a:t>3/8/2018</a:t>
+              <a:t>3/20/2018</a:t>
             </a:fld>
             <a:endParaRPr lang="en-US"/>
           </a:p>
@@ -1967,7 +1970,7 @@
           <a:p>
             <a:fld id="{033AF4C7-B9F7-8C43-BECF-42CF3A22F2FA}" type="datetimeFigureOut">
               <a:rPr lang="en-US" smtClean="0"/>
-              <a:t>3/8/2018</a:t>
+              <a:t>3/20/2018</a:t>
             </a:fld>
             <a:endParaRPr lang="en-US"/>
           </a:p>
@@ -2080,7 +2083,7 @@
           <a:p>
             <a:fld id="{033AF4C7-B9F7-8C43-BECF-42CF3A22F2FA}" type="datetimeFigureOut">
               <a:rPr lang="en-US" smtClean="0"/>
-              <a:t>3/8/2018</a:t>
+              <a:t>3/20/2018</a:t>
             </a:fld>
             <a:endParaRPr lang="en-US"/>
           </a:p>
@@ -2391,7 +2394,7 @@
           <a:p>
             <a:fld id="{033AF4C7-B9F7-8C43-BECF-42CF3A22F2FA}" type="datetimeFigureOut">
               <a:rPr lang="en-US" smtClean="0"/>
-              <a:t>3/8/2018</a:t>
+              <a:t>3/20/2018</a:t>
             </a:fld>
             <a:endParaRPr lang="en-US"/>
           </a:p>
@@ -2679,7 +2682,7 @@
           <a:p>
             <a:fld id="{033AF4C7-B9F7-8C43-BECF-42CF3A22F2FA}" type="datetimeFigureOut">
               <a:rPr lang="en-US" smtClean="0"/>
-              <a:t>3/8/2018</a:t>
+              <a:t>3/20/2018</a:t>
             </a:fld>
             <a:endParaRPr lang="en-US"/>
           </a:p>
@@ -2929,7 +2932,7 @@
           <a:p>
             <a:fld id="{033AF4C7-B9F7-8C43-BECF-42CF3A22F2FA}" type="datetimeFigureOut">
               <a:rPr lang="en-US" smtClean="0"/>
-              <a:t>3/8/2018</a:t>
+              <a:t>3/20/2018</a:t>
             </a:fld>
             <a:endParaRPr lang="en-US"/>
           </a:p>
@@ -3645,6 +3648,243 @@
       </p:grpSpPr>
       <p:sp>
         <p:nvSpPr>
+          <p:cNvPr id="2" name="Title 1">
+            <a:extLst>
+              <a:ext uri="{FF2B5EF4-FFF2-40B4-BE49-F238E27FC236}">
+                <a16:creationId xmlns:a16="http://schemas.microsoft.com/office/drawing/2014/main" id="{16E2B136-6D13-BE4B-B14F-D07906BD7190}"/>
+              </a:ext>
+            </a:extLst>
+          </p:cNvPr>
+          <p:cNvSpPr>
+            <a:spLocks noGrp="1"/>
+          </p:cNvSpPr>
+          <p:nvPr>
+            <p:ph type="title"/>
+          </p:nvPr>
+        </p:nvSpPr>
+        <p:spPr/>
+        <p:txBody>
+          <a:bodyPr/>
+          <a:lstStyle/>
+          <a:p>
+            <a:r>
+              <a:rPr lang="en-US" dirty="0"/>
+              <a:t>Results </a:t>
+            </a:r>
+          </a:p>
+        </p:txBody>
+      </p:sp>
+      <p:sp>
+        <p:nvSpPr>
+          <p:cNvPr id="3" name="Content Placeholder 2">
+            <a:extLst>
+              <a:ext uri="{FF2B5EF4-FFF2-40B4-BE49-F238E27FC236}">
+                <a16:creationId xmlns:a16="http://schemas.microsoft.com/office/drawing/2014/main" id="{01568967-352F-C544-9C71-95BDE616181A}"/>
+              </a:ext>
+            </a:extLst>
+          </p:cNvPr>
+          <p:cNvSpPr>
+            <a:spLocks noGrp="1"/>
+          </p:cNvSpPr>
+          <p:nvPr>
+            <p:ph idx="1"/>
+          </p:nvPr>
+        </p:nvSpPr>
+        <p:spPr/>
+        <p:txBody>
+          <a:bodyPr/>
+          <a:lstStyle/>
+          <a:p>
+            <a:endParaRPr lang="en-US"/>
+          </a:p>
+        </p:txBody>
+      </p:sp>
+    </p:spTree>
+    <p:extLst>
+      <p:ext uri="{BB962C8B-B14F-4D97-AF65-F5344CB8AC3E}">
+        <p14:creationId xmlns:p14="http://schemas.microsoft.com/office/powerpoint/2010/main" val="40322485"/>
+      </p:ext>
+    </p:extLst>
+  </p:cSld>
+  <p:clrMapOvr>
+    <a:masterClrMapping/>
+  </p:clrMapOvr>
+</p:sld>
+</file>
+
+<file path=ppt/slides/slide11.xml><?xml version="1.0" encoding="utf-8"?>
+<p:sld xmlns:a="http://schemas.openxmlformats.org/drawingml/2006/main" xmlns:r="http://schemas.openxmlformats.org/officeDocument/2006/relationships" xmlns:p="http://schemas.openxmlformats.org/presentationml/2006/main">
+  <p:cSld>
+    <p:spTree>
+      <p:nvGrpSpPr>
+        <p:cNvPr id="1" name=""/>
+        <p:cNvGrpSpPr/>
+        <p:nvPr/>
+      </p:nvGrpSpPr>
+      <p:grpSpPr>
+        <a:xfrm>
+          <a:off x="0" y="0"/>
+          <a:ext cx="0" cy="0"/>
+          <a:chOff x="0" y="0"/>
+          <a:chExt cx="0" cy="0"/>
+        </a:xfrm>
+      </p:grpSpPr>
+      <p:sp>
+        <p:nvSpPr>
+          <p:cNvPr id="2" name="Title 1">
+            <a:extLst>
+              <a:ext uri="{FF2B5EF4-FFF2-40B4-BE49-F238E27FC236}">
+                <a16:creationId xmlns:a16="http://schemas.microsoft.com/office/drawing/2014/main" id="{E40DE2C7-6055-9A45-916E-87B3B19860AB}"/>
+              </a:ext>
+            </a:extLst>
+          </p:cNvPr>
+          <p:cNvSpPr>
+            <a:spLocks noGrp="1"/>
+          </p:cNvSpPr>
+          <p:nvPr>
+            <p:ph type="title"/>
+          </p:nvPr>
+        </p:nvSpPr>
+        <p:spPr/>
+        <p:txBody>
+          <a:bodyPr>
+            <a:normAutofit fontScale="90000"/>
+          </a:bodyPr>
+          <a:lstStyle/>
+          <a:p>
+            <a:r>
+              <a:rPr lang="en-GB" dirty="0"/>
+              <a:t>limitations and ideas for future work as a minimum</a:t>
+            </a:r>
+            <a:br>
+              <a:rPr lang="en-GB" dirty="0"/>
+            </a:br>
+            <a:endParaRPr lang="en-US" dirty="0"/>
+          </a:p>
+        </p:txBody>
+      </p:sp>
+      <p:sp>
+        <p:nvSpPr>
+          <p:cNvPr id="3" name="Content Placeholder 2">
+            <a:extLst>
+              <a:ext uri="{FF2B5EF4-FFF2-40B4-BE49-F238E27FC236}">
+                <a16:creationId xmlns:a16="http://schemas.microsoft.com/office/drawing/2014/main" id="{26EE4ED4-D972-C145-A417-CACCB24BD07F}"/>
+              </a:ext>
+            </a:extLst>
+          </p:cNvPr>
+          <p:cNvSpPr>
+            <a:spLocks noGrp="1"/>
+          </p:cNvSpPr>
+          <p:nvPr>
+            <p:ph idx="1"/>
+          </p:nvPr>
+        </p:nvSpPr>
+        <p:spPr/>
+        <p:txBody>
+          <a:bodyPr/>
+          <a:lstStyle/>
+          <a:p>
+            <a:endParaRPr lang="en-US" dirty="0"/>
+          </a:p>
+        </p:txBody>
+      </p:sp>
+    </p:spTree>
+    <p:extLst>
+      <p:ext uri="{BB962C8B-B14F-4D97-AF65-F5344CB8AC3E}">
+        <p14:creationId xmlns:p14="http://schemas.microsoft.com/office/powerpoint/2010/main" val="3080921139"/>
+      </p:ext>
+    </p:extLst>
+  </p:cSld>
+  <p:clrMapOvr>
+    <a:masterClrMapping/>
+  </p:clrMapOvr>
+</p:sld>
+</file>
+
+<file path=ppt/slides/slide12.xml><?xml version="1.0" encoding="utf-8"?>
+<p:sld xmlns:a="http://schemas.openxmlformats.org/drawingml/2006/main" xmlns:r="http://schemas.openxmlformats.org/officeDocument/2006/relationships" xmlns:p="http://schemas.openxmlformats.org/presentationml/2006/main">
+  <p:cSld>
+    <p:spTree>
+      <p:nvGrpSpPr>
+        <p:cNvPr id="1" name=""/>
+        <p:cNvGrpSpPr/>
+        <p:nvPr/>
+      </p:nvGrpSpPr>
+      <p:grpSpPr>
+        <a:xfrm>
+          <a:off x="0" y="0"/>
+          <a:ext cx="0" cy="0"/>
+          <a:chOff x="0" y="0"/>
+          <a:chExt cx="0" cy="0"/>
+        </a:xfrm>
+      </p:grpSpPr>
+      <p:sp>
+        <p:nvSpPr>
+          <p:cNvPr id="2" name="Title 1">
+            <a:extLst>
+              <a:ext uri="{FF2B5EF4-FFF2-40B4-BE49-F238E27FC236}">
+                <a16:creationId xmlns:a16="http://schemas.microsoft.com/office/drawing/2014/main" id="{D6643F67-ADC2-CF44-A379-3EC0A9329A42}"/>
+              </a:ext>
+            </a:extLst>
+          </p:cNvPr>
+          <p:cNvSpPr>
+            <a:spLocks noGrp="1"/>
+          </p:cNvSpPr>
+          <p:nvPr>
+            <p:ph type="title"/>
+          </p:nvPr>
+        </p:nvSpPr>
+        <p:spPr/>
+        <p:txBody>
+          <a:bodyPr/>
+          <a:lstStyle/>
+          <a:p>
+            <a:pPr algn="ctr"/>
+            <a:r>
+              <a:rPr lang="en-US" b="1" dirty="0">
+                <a:latin typeface="+mn-lt"/>
+              </a:rPr>
+              <a:t>Conclusion</a:t>
+            </a:r>
+            <a:r>
+              <a:rPr lang="en-US" dirty="0"/>
+              <a:t> </a:t>
+            </a:r>
+          </a:p>
+        </p:txBody>
+      </p:sp>
+    </p:spTree>
+    <p:extLst>
+      <p:ext uri="{BB962C8B-B14F-4D97-AF65-F5344CB8AC3E}">
+        <p14:creationId xmlns:p14="http://schemas.microsoft.com/office/powerpoint/2010/main" val="1353114092"/>
+      </p:ext>
+    </p:extLst>
+  </p:cSld>
+  <p:clrMapOvr>
+    <a:masterClrMapping/>
+  </p:clrMapOvr>
+</p:sld>
+</file>
+
+<file path=ppt/slides/slide13.xml><?xml version="1.0" encoding="utf-8"?>
+<p:sld xmlns:a="http://schemas.openxmlformats.org/drawingml/2006/main" xmlns:r="http://schemas.openxmlformats.org/officeDocument/2006/relationships" xmlns:p="http://schemas.openxmlformats.org/presentationml/2006/main">
+  <p:cSld>
+    <p:spTree>
+      <p:nvGrpSpPr>
+        <p:cNvPr id="1" name=""/>
+        <p:cNvGrpSpPr/>
+        <p:nvPr/>
+      </p:nvGrpSpPr>
+      <p:grpSpPr>
+        <a:xfrm>
+          <a:off x="0" y="0"/>
+          <a:ext cx="0" cy="0"/>
+          <a:chOff x="0" y="0"/>
+          <a:chExt cx="0" cy="0"/>
+        </a:xfrm>
+      </p:grpSpPr>
+      <p:sp>
+        <p:nvSpPr>
           <p:cNvPr id="7" name="TextBox 6">
             <a:extLst>
               <a:ext uri="{FF2B5EF4-FFF2-40B4-BE49-F238E27FC236}">
@@ -3772,7 +4012,7 @@
 </p:sld>
 </file>
 
-<file path=ppt/slides/slide11.xml><?xml version="1.0" encoding="utf-8"?>
+<file path=ppt/slides/slide14.xml><?xml version="1.0" encoding="utf-8"?>
 <p:sld xmlns:a="http://schemas.openxmlformats.org/drawingml/2006/main" xmlns:r="http://schemas.openxmlformats.org/officeDocument/2006/relationships" xmlns:p="http://schemas.openxmlformats.org/presentationml/2006/main">
   <p:cSld>
     <p:spTree>
@@ -3860,7 +4100,7 @@
 </p:sld>
 </file>
 
-<file path=ppt/slides/slide12.xml><?xml version="1.0" encoding="utf-8"?>
+<file path=ppt/slides/slide15.xml><?xml version="1.0" encoding="utf-8"?>
 <p:sld xmlns:a="http://schemas.openxmlformats.org/drawingml/2006/main" xmlns:r="http://schemas.openxmlformats.org/officeDocument/2006/relationships" xmlns:p="http://schemas.openxmlformats.org/presentationml/2006/main">
   <p:cSld>
     <p:spTree>
@@ -4682,7 +4922,7 @@
           <a:p>
             <a:r>
               <a:rPr lang="en-GB" dirty="0"/>
-              <a:t>project’s aims and objectives </a:t>
+              <a:t>Project Aims and Objectives</a:t>
             </a:r>
             <a:endParaRPr lang="en-US" dirty="0"/>
           </a:p>
@@ -4706,10 +4946,105 @@
         </p:nvSpPr>
         <p:spPr/>
         <p:txBody>
-          <a:bodyPr/>
-          <a:lstStyle/>
-          <a:p>
-            <a:endParaRPr lang="en-US"/>
+          <a:bodyPr>
+            <a:normAutofit/>
+          </a:bodyPr>
+          <a:lstStyle/>
+          <a:p>
+            <a:pPr marL="228600" indent="-228600" algn="l" defTabSz="914400" rtl="0" eaLnBrk="1" latinLnBrk="0" hangingPunct="1">
+              <a:lnSpc>
+                <a:spcPct val="90000"/>
+              </a:lnSpc>
+              <a:spcBef>
+                <a:spcPts val="1000"/>
+              </a:spcBef>
+              <a:buFont typeface="Arial" panose="020B0604020202020204" pitchFamily="34" charset="0"/>
+              <a:buChar char="•"/>
+            </a:pPr>
+            <a:r>
+              <a:rPr lang="en-US" dirty="0"/>
+              <a:t>Ava should be able to start and continue conversations</a:t>
+            </a:r>
+          </a:p>
+          <a:p>
+            <a:pPr marL="228600" indent="-228600" algn="l" defTabSz="914400" rtl="0" eaLnBrk="1" latinLnBrk="0" hangingPunct="1">
+              <a:lnSpc>
+                <a:spcPct val="90000"/>
+              </a:lnSpc>
+              <a:spcBef>
+                <a:spcPts val="1000"/>
+              </a:spcBef>
+              <a:buFont typeface="Arial" panose="020B0604020202020204" pitchFamily="34" charset="0"/>
+              <a:buChar char="•"/>
+            </a:pPr>
+            <a:r>
+              <a:rPr lang="en-US" dirty="0"/>
+              <a:t>Ava should be able to respond based on keyword detection</a:t>
+            </a:r>
+          </a:p>
+          <a:p>
+            <a:pPr marL="228600" indent="-228600" algn="l" defTabSz="914400" rtl="0" eaLnBrk="1" latinLnBrk="0" hangingPunct="1">
+              <a:lnSpc>
+                <a:spcPct val="90000"/>
+              </a:lnSpc>
+              <a:spcBef>
+                <a:spcPts val="1000"/>
+              </a:spcBef>
+              <a:buFont typeface="Arial" panose="020B0604020202020204" pitchFamily="34" charset="0"/>
+              <a:buChar char="•"/>
+            </a:pPr>
+            <a:r>
+              <a:rPr lang="en-US" dirty="0"/>
+              <a:t>The code for Ava should showcase proper understand of object-orientated programming</a:t>
+            </a:r>
+          </a:p>
+          <a:p>
+            <a:pPr marL="228600" indent="-228600" algn="l" defTabSz="914400" rtl="0" eaLnBrk="1" latinLnBrk="0" hangingPunct="1">
+              <a:lnSpc>
+                <a:spcPct val="90000"/>
+              </a:lnSpc>
+              <a:spcBef>
+                <a:spcPts val="1000"/>
+              </a:spcBef>
+              <a:buFont typeface="Arial" panose="020B0604020202020204" pitchFamily="34" charset="0"/>
+              <a:buChar char="•"/>
+            </a:pPr>
+            <a:r>
+              <a:rPr lang="en-US" dirty="0"/>
+              <a:t>Ava should support simple profile creation</a:t>
+            </a:r>
+          </a:p>
+          <a:p>
+            <a:pPr marL="228600" indent="-228600" algn="l" defTabSz="914400" rtl="0" eaLnBrk="1" latinLnBrk="0" hangingPunct="1">
+              <a:lnSpc>
+                <a:spcPct val="90000"/>
+              </a:lnSpc>
+              <a:spcBef>
+                <a:spcPts val="1000"/>
+              </a:spcBef>
+              <a:buFont typeface="Arial" panose="020B0604020202020204" pitchFamily="34" charset="0"/>
+              <a:buChar char="•"/>
+            </a:pPr>
+            <a:r>
+              <a:rPr lang="en-US" dirty="0"/>
+              <a:t>Ava should utilize a database to store and access useful data</a:t>
+            </a:r>
+          </a:p>
+          <a:p>
+            <a:pPr marL="228600" indent="-228600" algn="l" defTabSz="914400" rtl="0" eaLnBrk="1" latinLnBrk="0" hangingPunct="1">
+              <a:lnSpc>
+                <a:spcPct val="90000"/>
+              </a:lnSpc>
+              <a:spcBef>
+                <a:spcPts val="1000"/>
+              </a:spcBef>
+              <a:buFont typeface="Arial" panose="020B0604020202020204" pitchFamily="34" charset="0"/>
+              <a:buChar char="•"/>
+            </a:pPr>
+            <a:r>
+              <a:rPr lang="en-US" dirty="0"/>
+              <a:t>Cross-platform compatibility for Ava should be maximized</a:t>
+            </a:r>
           </a:p>
         </p:txBody>
       </p:sp>
@@ -4748,7 +5083,7 @@
           <p:cNvPr id="2" name="Title 1">
             <a:extLst>
               <a:ext uri="{FF2B5EF4-FFF2-40B4-BE49-F238E27FC236}">
-                <a16:creationId xmlns:a16="http://schemas.microsoft.com/office/drawing/2014/main" id="{0FFBFF67-5002-0548-A853-2710872993A1}"/>
+                <a16:creationId xmlns:a16="http://schemas.microsoft.com/office/drawing/2014/main" id="{C6823313-AC98-4365-A021-2F98D259FC5C}"/>
               </a:ext>
             </a:extLst>
           </p:cNvPr>
@@ -4766,9 +5101,8 @@
           <a:p>
             <a:r>
               <a:rPr lang="en-GB" dirty="0"/>
-              <a:t>existing alternatives</a:t>
-            </a:r>
-            <a:endParaRPr lang="en-US" dirty="0"/>
+              <a:t>Project Aims and Objectives continued</a:t>
+            </a:r>
           </a:p>
         </p:txBody>
       </p:sp>
@@ -4777,7 +5111,7 @@
           <p:cNvPr id="3" name="Content Placeholder 2">
             <a:extLst>
               <a:ext uri="{FF2B5EF4-FFF2-40B4-BE49-F238E27FC236}">
-                <a16:creationId xmlns:a16="http://schemas.microsoft.com/office/drawing/2014/main" id="{FC1A483C-3D22-AD4A-BFA0-D27E6486F079}"/>
+                <a16:creationId xmlns:a16="http://schemas.microsoft.com/office/drawing/2014/main" id="{09B7BDD4-7383-4290-9DF6-0D3CA8970029}"/>
               </a:ext>
             </a:extLst>
           </p:cNvPr>
@@ -4793,14 +5127,35 @@
           <a:bodyPr/>
           <a:lstStyle/>
           <a:p>
-            <a:endParaRPr lang="en-US"/>
+            <a:r>
+              <a:rPr lang="en-US" dirty="0"/>
+              <a:t>Ava should be kept updated and maintained</a:t>
+            </a:r>
+          </a:p>
+          <a:p>
+            <a:r>
+              <a:rPr lang="en-GB" dirty="0"/>
+              <a:t>Ava should be able to make use of text to speech systems</a:t>
+            </a:r>
+          </a:p>
+          <a:p>
+            <a:r>
+              <a:rPr lang="en-GB" dirty="0"/>
+              <a:t>Restrictions should be put in place on users to prevent unacceptable behaviour</a:t>
+            </a:r>
+          </a:p>
+          <a:p>
+            <a:r>
+              <a:rPr lang="en-GB" dirty="0"/>
+              <a:t>Multiple access levels should be put in place to prevent unauthorised access to data</a:t>
+            </a:r>
           </a:p>
         </p:txBody>
       </p:sp>
     </p:spTree>
     <p:extLst>
       <p:ext uri="{BB962C8B-B14F-4D97-AF65-F5344CB8AC3E}">
-        <p14:creationId xmlns:p14="http://schemas.microsoft.com/office/powerpoint/2010/main" val="3924014586"/>
+        <p14:creationId xmlns:p14="http://schemas.microsoft.com/office/powerpoint/2010/main" val="2905122169"/>
       </p:ext>
     </p:extLst>
   </p:cSld>
@@ -4832,7 +5187,7 @@
           <p:cNvPr id="2" name="Title 1">
             <a:extLst>
               <a:ext uri="{FF2B5EF4-FFF2-40B4-BE49-F238E27FC236}">
-                <a16:creationId xmlns:a16="http://schemas.microsoft.com/office/drawing/2014/main" id="{02FE362D-C461-D349-95B6-E2ACFE3EDD7D}"/>
+                <a16:creationId xmlns:a16="http://schemas.microsoft.com/office/drawing/2014/main" id="{D4F24A10-31F4-401E-9458-EE6C408BD171}"/>
               </a:ext>
             </a:extLst>
           </p:cNvPr>
@@ -4850,9 +5205,8 @@
           <a:p>
             <a:r>
               <a:rPr lang="en-GB" dirty="0"/>
-              <a:t>development approach</a:t>
-            </a:r>
-            <a:endParaRPr lang="en-US" dirty="0"/>
+              <a:t>Functional Requirements</a:t>
+            </a:r>
           </a:p>
         </p:txBody>
       </p:sp>
@@ -4861,7 +5215,7 @@
           <p:cNvPr id="3" name="Content Placeholder 2">
             <a:extLst>
               <a:ext uri="{FF2B5EF4-FFF2-40B4-BE49-F238E27FC236}">
-                <a16:creationId xmlns:a16="http://schemas.microsoft.com/office/drawing/2014/main" id="{372D8203-6BEB-424A-A515-E62F07B4328E}"/>
+                <a16:creationId xmlns:a16="http://schemas.microsoft.com/office/drawing/2014/main" id="{2114BA15-E32C-4873-A941-A191C3591C96}"/>
               </a:ext>
             </a:extLst>
           </p:cNvPr>
@@ -4877,14 +5231,32 @@
           <a:bodyPr/>
           <a:lstStyle/>
           <a:p>
-            <a:endParaRPr lang="en-US"/>
+            <a:r>
+              <a:rPr lang="en-GB" dirty="0"/>
+              <a:t>Rules and boundaries – what Ava can ‘learn’ should be limited to ensure that it both fits well into its role and does not hinder the user.</a:t>
+            </a:r>
+          </a:p>
+          <a:p>
+            <a:r>
+              <a:rPr lang="en-GB" dirty="0"/>
+              <a:t>Human language – Ava should be able to understand what the user is saying, despite the difficulties of understanding human language in use.</a:t>
+            </a:r>
+          </a:p>
+          <a:p>
+            <a:r>
+              <a:rPr lang="en-GB" dirty="0"/>
+              <a:t>Different levels of users – Ava should be set up with different levels of users with different levels of access, to prevent access to         sensitive data</a:t>
+            </a:r>
+          </a:p>
+          <a:p>
+            <a:endParaRPr lang="en-GB" dirty="0"/>
           </a:p>
         </p:txBody>
       </p:sp>
     </p:spTree>
     <p:extLst>
       <p:ext uri="{BB962C8B-B14F-4D97-AF65-F5344CB8AC3E}">
-        <p14:creationId xmlns:p14="http://schemas.microsoft.com/office/powerpoint/2010/main" val="4026979612"/>
+        <p14:creationId xmlns:p14="http://schemas.microsoft.com/office/powerpoint/2010/main" val="1180646259"/>
       </p:ext>
     </p:extLst>
   </p:cSld>
@@ -4916,7 +5288,7 @@
           <p:cNvPr id="2" name="Title 1">
             <a:extLst>
               <a:ext uri="{FF2B5EF4-FFF2-40B4-BE49-F238E27FC236}">
-                <a16:creationId xmlns:a16="http://schemas.microsoft.com/office/drawing/2014/main" id="{16E2B136-6D13-BE4B-B14F-D07906BD7190}"/>
+                <a16:creationId xmlns:a16="http://schemas.microsoft.com/office/drawing/2014/main" id="{8D588EB3-41BC-455A-AEEA-813FB04A0845}"/>
               </a:ext>
             </a:extLst>
           </p:cNvPr>
@@ -4933,8 +5305,8 @@
           <a:lstStyle/>
           <a:p>
             <a:r>
-              <a:rPr lang="en-US" dirty="0"/>
-              <a:t>Results </a:t>
+              <a:rPr lang="en-GB" dirty="0"/>
+              <a:t>Non-Functional Requirements</a:t>
             </a:r>
           </a:p>
         </p:txBody>
@@ -4944,7 +5316,7 @@
           <p:cNvPr id="3" name="Content Placeholder 2">
             <a:extLst>
               <a:ext uri="{FF2B5EF4-FFF2-40B4-BE49-F238E27FC236}">
-                <a16:creationId xmlns:a16="http://schemas.microsoft.com/office/drawing/2014/main" id="{01568967-352F-C544-9C71-95BDE616181A}"/>
+                <a16:creationId xmlns:a16="http://schemas.microsoft.com/office/drawing/2014/main" id="{0E992746-CAC6-48B0-9927-8F15B779AF31}"/>
               </a:ext>
             </a:extLst>
           </p:cNvPr>
@@ -4957,17 +5329,46 @@
         </p:nvSpPr>
         <p:spPr/>
         <p:txBody>
-          <a:bodyPr/>
-          <a:lstStyle/>
-          <a:p>
-            <a:endParaRPr lang="en-US"/>
+          <a:bodyPr>
+            <a:normAutofit lnSpcReduction="10000"/>
+          </a:bodyPr>
+          <a:lstStyle/>
+          <a:p>
+            <a:r>
+              <a:rPr lang="en-GB" dirty="0"/>
+              <a:t>Dynamic answers – Ava should have a variety of different answers to possible questions to avoid repetition</a:t>
+            </a:r>
+          </a:p>
+          <a:p>
+            <a:r>
+              <a:rPr lang="en-GB" dirty="0"/>
+              <a:t>Services – Ava should be able to provide simple external services to users with appropriate prompting</a:t>
+            </a:r>
+          </a:p>
+          <a:p>
+            <a:r>
+              <a:rPr lang="en-GB" dirty="0"/>
+              <a:t>Interface – Ava should have a clean and simple interface to aid understanding.</a:t>
+            </a:r>
+          </a:p>
+          <a:p>
+            <a:r>
+              <a:rPr lang="en-GB" dirty="0"/>
+              <a:t>Availability – Ava should be able to work across different        platforms </a:t>
+            </a:r>
+          </a:p>
+          <a:p>
+            <a:r>
+              <a:rPr lang="en-GB" dirty="0"/>
+              <a:t>Recoverability – Ava should be able to recover past          conversations and other useful data</a:t>
+            </a:r>
           </a:p>
         </p:txBody>
       </p:sp>
     </p:spTree>
     <p:extLst>
       <p:ext uri="{BB962C8B-B14F-4D97-AF65-F5344CB8AC3E}">
-        <p14:creationId xmlns:p14="http://schemas.microsoft.com/office/powerpoint/2010/main" val="40322485"/>
+        <p14:creationId xmlns:p14="http://schemas.microsoft.com/office/powerpoint/2010/main" val="63073770"/>
       </p:ext>
     </p:extLst>
   </p:cSld>
@@ -4999,7 +5400,7 @@
           <p:cNvPr id="2" name="Title 1">
             <a:extLst>
               <a:ext uri="{FF2B5EF4-FFF2-40B4-BE49-F238E27FC236}">
-                <a16:creationId xmlns:a16="http://schemas.microsoft.com/office/drawing/2014/main" id="{E40DE2C7-6055-9A45-916E-87B3B19860AB}"/>
+                <a16:creationId xmlns:a16="http://schemas.microsoft.com/office/drawing/2014/main" id="{0FFBFF67-5002-0548-A853-2710872993A1}"/>
               </a:ext>
             </a:extLst>
           </p:cNvPr>
@@ -5012,18 +5413,13 @@
         </p:nvSpPr>
         <p:spPr/>
         <p:txBody>
-          <a:bodyPr>
-            <a:normAutofit fontScale="90000"/>
-          </a:bodyPr>
+          <a:bodyPr/>
           <a:lstStyle/>
           <a:p>
             <a:r>
               <a:rPr lang="en-GB" dirty="0"/>
-              <a:t>limitations and ideas for future work as a minimum</a:t>
-            </a:r>
-            <a:br>
-              <a:rPr lang="en-GB" dirty="0"/>
-            </a:br>
+              <a:t>existing alternatives</a:t>
+            </a:r>
             <a:endParaRPr lang="en-US" dirty="0"/>
           </a:p>
         </p:txBody>
@@ -5033,7 +5429,7 @@
           <p:cNvPr id="3" name="Content Placeholder 2">
             <a:extLst>
               <a:ext uri="{FF2B5EF4-FFF2-40B4-BE49-F238E27FC236}">
-                <a16:creationId xmlns:a16="http://schemas.microsoft.com/office/drawing/2014/main" id="{26EE4ED4-D972-C145-A417-CACCB24BD07F}"/>
+                <a16:creationId xmlns:a16="http://schemas.microsoft.com/office/drawing/2014/main" id="{FC1A483C-3D22-AD4A-BFA0-D27E6486F079}"/>
               </a:ext>
             </a:extLst>
           </p:cNvPr>
@@ -5049,14 +5445,14 @@
           <a:bodyPr/>
           <a:lstStyle/>
           <a:p>
-            <a:endParaRPr lang="en-US" dirty="0"/>
+            <a:endParaRPr lang="en-US"/>
           </a:p>
         </p:txBody>
       </p:sp>
     </p:spTree>
     <p:extLst>
       <p:ext uri="{BB962C8B-B14F-4D97-AF65-F5344CB8AC3E}">
-        <p14:creationId xmlns:p14="http://schemas.microsoft.com/office/powerpoint/2010/main" val="3080921139"/>
+        <p14:creationId xmlns:p14="http://schemas.microsoft.com/office/powerpoint/2010/main" val="3924014586"/>
       </p:ext>
     </p:extLst>
   </p:cSld>
@@ -5088,7 +5484,7 @@
           <p:cNvPr id="2" name="Title 1">
             <a:extLst>
               <a:ext uri="{FF2B5EF4-FFF2-40B4-BE49-F238E27FC236}">
-                <a16:creationId xmlns:a16="http://schemas.microsoft.com/office/drawing/2014/main" id="{D6643F67-ADC2-CF44-A379-3EC0A9329A42}"/>
+                <a16:creationId xmlns:a16="http://schemas.microsoft.com/office/drawing/2014/main" id="{02FE362D-C461-D349-95B6-E2ACFE3EDD7D}"/>
               </a:ext>
             </a:extLst>
           </p:cNvPr>
@@ -5104,24 +5500,43 @@
           <a:bodyPr/>
           <a:lstStyle/>
           <a:p>
-            <a:pPr algn="ctr"/>
-            <a:r>
-              <a:rPr lang="en-US" b="1" dirty="0">
-                <a:latin typeface="+mn-lt"/>
-              </a:rPr>
-              <a:t>Conclusion</a:t>
-            </a:r>
-            <a:r>
-              <a:rPr lang="en-US" dirty="0"/>
-              <a:t> </a:t>
-            </a:r>
+            <a:r>
+              <a:rPr lang="en-GB" dirty="0"/>
+              <a:t>development approach</a:t>
+            </a:r>
+            <a:endParaRPr lang="en-US" dirty="0"/>
+          </a:p>
+        </p:txBody>
+      </p:sp>
+      <p:sp>
+        <p:nvSpPr>
+          <p:cNvPr id="3" name="Content Placeholder 2">
+            <a:extLst>
+              <a:ext uri="{FF2B5EF4-FFF2-40B4-BE49-F238E27FC236}">
+                <a16:creationId xmlns:a16="http://schemas.microsoft.com/office/drawing/2014/main" id="{372D8203-6BEB-424A-A515-E62F07B4328E}"/>
+              </a:ext>
+            </a:extLst>
+          </p:cNvPr>
+          <p:cNvSpPr>
+            <a:spLocks noGrp="1"/>
+          </p:cNvSpPr>
+          <p:nvPr>
+            <p:ph idx="1"/>
+          </p:nvPr>
+        </p:nvSpPr>
+        <p:spPr/>
+        <p:txBody>
+          <a:bodyPr/>
+          <a:lstStyle/>
+          <a:p>
+            <a:endParaRPr lang="en-US"/>
           </a:p>
         </p:txBody>
       </p:sp>
     </p:spTree>
     <p:extLst>
       <p:ext uri="{BB962C8B-B14F-4D97-AF65-F5344CB8AC3E}">
-        <p14:creationId xmlns:p14="http://schemas.microsoft.com/office/powerpoint/2010/main" val="1353114092"/>
+        <p14:creationId xmlns:p14="http://schemas.microsoft.com/office/powerpoint/2010/main" val="4026979612"/>
       </p:ext>
     </p:extLst>
   </p:cSld>

</xml_diff>